<commit_message>
Removing wrong success measure
</commit_message>
<xml_diff>
--- a/relatorio/Fase 2/LI4.pptx
+++ b/relatorio/Fase 2/LI4.pptx
@@ -8142,7 +8142,7 @@
         <p:spPr>
           <a:xfrm>
             <a:off x="444137" y="1237963"/>
-            <a:ext cx="8987246" cy="4801314"/>
+            <a:ext cx="8987246" cy="4247317"/>
           </a:xfrm>
           <a:prstGeom prst="rect">
             <a:avLst/>
@@ -8218,39 +8218,7 @@
             </a:r>
           </a:p>
           <a:p>
-            <a:pPr marL="285750" lvl="0" indent="-285750" algn="just">
-              <a:buFont typeface="Arial" panose="020B0604020202020204" pitchFamily="34" charset="0"/>
-              <a:buChar char="•"/>
-            </a:pPr>
-            <a:endParaRPr lang="pt-PT" dirty="0"/>
-          </a:p>
-          <a:p>
-            <a:pPr marL="285750" lvl="0" indent="-285750" algn="just">
-              <a:buFont typeface="Arial" panose="020B0604020202020204" pitchFamily="34" charset="0"/>
-              <a:buChar char="•"/>
-            </a:pPr>
-            <a:r>
-              <a:rPr lang="pt-PT" dirty="0"/>
-              <a:t>Verificar </a:t>
-            </a:r>
-            <a:r>
-              <a:rPr lang="pt-PT" b="1" dirty="0">
-                <a:solidFill>
-                  <a:schemeClr val="accent2"/>
-                </a:solidFill>
-              </a:rPr>
-              <a:t>escalabilidade</a:t>
-            </a:r>
-            <a:r>
-              <a:rPr lang="pt-PT" dirty="0"/>
-              <a:t> do sistema para outros infantários;</a:t>
-            </a:r>
-          </a:p>
-          <a:p>
-            <a:pPr marL="285750" lvl="0" indent="-285750" algn="just">
-              <a:buFont typeface="Arial" panose="020B0604020202020204" pitchFamily="34" charset="0"/>
-              <a:buChar char="•"/>
-            </a:pPr>
+            <a:pPr lvl="0" algn="just"/>
             <a:endParaRPr lang="pt-PT" dirty="0"/>
           </a:p>
           <a:p>

</xml_diff>